<commit_message>
make brush more pronounced
</commit_message>
<xml_diff>
--- a/figures/ppt2.pptx
+++ b/figures/ppt2.pptx
@@ -271,7 +271,7 @@
           <a:p>
             <a:fld id="{6E2F875C-AAF5-43A6-8DB1-78AD4C1DB883}" type="datetimeFigureOut">
               <a:rPr lang="en-US" smtClean="0"/>
-              <a:t>13/7/2020</a:t>
+              <a:t>24/9/2020</a:t>
             </a:fld>
             <a:endParaRPr lang="en-US"/>
           </a:p>
@@ -469,7 +469,7 @@
           <a:p>
             <a:fld id="{6E2F875C-AAF5-43A6-8DB1-78AD4C1DB883}" type="datetimeFigureOut">
               <a:rPr lang="en-US" smtClean="0"/>
-              <a:t>13/7/2020</a:t>
+              <a:t>24/9/2020</a:t>
             </a:fld>
             <a:endParaRPr lang="en-US"/>
           </a:p>
@@ -677,7 +677,7 @@
           <a:p>
             <a:fld id="{6E2F875C-AAF5-43A6-8DB1-78AD4C1DB883}" type="datetimeFigureOut">
               <a:rPr lang="en-US" smtClean="0"/>
-              <a:t>13/7/2020</a:t>
+              <a:t>24/9/2020</a:t>
             </a:fld>
             <a:endParaRPr lang="en-US"/>
           </a:p>
@@ -875,7 +875,7 @@
           <a:p>
             <a:fld id="{6E2F875C-AAF5-43A6-8DB1-78AD4C1DB883}" type="datetimeFigureOut">
               <a:rPr lang="en-US" smtClean="0"/>
-              <a:t>13/7/2020</a:t>
+              <a:t>24/9/2020</a:t>
             </a:fld>
             <a:endParaRPr lang="en-US"/>
           </a:p>
@@ -1150,7 +1150,7 @@
           <a:p>
             <a:fld id="{6E2F875C-AAF5-43A6-8DB1-78AD4C1DB883}" type="datetimeFigureOut">
               <a:rPr lang="en-US" smtClean="0"/>
-              <a:t>13/7/2020</a:t>
+              <a:t>24/9/2020</a:t>
             </a:fld>
             <a:endParaRPr lang="en-US"/>
           </a:p>
@@ -1415,7 +1415,7 @@
           <a:p>
             <a:fld id="{6E2F875C-AAF5-43A6-8DB1-78AD4C1DB883}" type="datetimeFigureOut">
               <a:rPr lang="en-US" smtClean="0"/>
-              <a:t>13/7/2020</a:t>
+              <a:t>24/9/2020</a:t>
             </a:fld>
             <a:endParaRPr lang="en-US"/>
           </a:p>
@@ -1827,7 +1827,7 @@
           <a:p>
             <a:fld id="{6E2F875C-AAF5-43A6-8DB1-78AD4C1DB883}" type="datetimeFigureOut">
               <a:rPr lang="en-US" smtClean="0"/>
-              <a:t>13/7/2020</a:t>
+              <a:t>24/9/2020</a:t>
             </a:fld>
             <a:endParaRPr lang="en-US"/>
           </a:p>
@@ -1968,7 +1968,7 @@
           <a:p>
             <a:fld id="{6E2F875C-AAF5-43A6-8DB1-78AD4C1DB883}" type="datetimeFigureOut">
               <a:rPr lang="en-US" smtClean="0"/>
-              <a:t>13/7/2020</a:t>
+              <a:t>24/9/2020</a:t>
             </a:fld>
             <a:endParaRPr lang="en-US"/>
           </a:p>
@@ -2081,7 +2081,7 @@
           <a:p>
             <a:fld id="{6E2F875C-AAF5-43A6-8DB1-78AD4C1DB883}" type="datetimeFigureOut">
               <a:rPr lang="en-US" smtClean="0"/>
-              <a:t>13/7/2020</a:t>
+              <a:t>24/9/2020</a:t>
             </a:fld>
             <a:endParaRPr lang="en-US"/>
           </a:p>
@@ -2392,7 +2392,7 @@
           <a:p>
             <a:fld id="{6E2F875C-AAF5-43A6-8DB1-78AD4C1DB883}" type="datetimeFigureOut">
               <a:rPr lang="en-US" smtClean="0"/>
-              <a:t>13/7/2020</a:t>
+              <a:t>24/9/2020</a:t>
             </a:fld>
             <a:endParaRPr lang="en-US"/>
           </a:p>
@@ -2680,7 +2680,7 @@
           <a:p>
             <a:fld id="{6E2F875C-AAF5-43A6-8DB1-78AD4C1DB883}" type="datetimeFigureOut">
               <a:rPr lang="en-US" smtClean="0"/>
-              <a:t>13/7/2020</a:t>
+              <a:t>24/9/2020</a:t>
             </a:fld>
             <a:endParaRPr lang="en-US"/>
           </a:p>
@@ -2921,7 +2921,7 @@
           <a:p>
             <a:fld id="{6E2F875C-AAF5-43A6-8DB1-78AD4C1DB883}" type="datetimeFigureOut">
               <a:rPr lang="en-US" smtClean="0"/>
-              <a:t>13/7/2020</a:t>
+              <a:t>24/9/2020</a:t>
             </a:fld>
             <a:endParaRPr lang="en-US"/>
           </a:p>
@@ -3583,10 +3583,10 @@
       </p:grpSpPr>
       <p:pic>
         <p:nvPicPr>
-          <p:cNvPr id="4" name="Picture 3" descr="A close up of a map&#10;&#10;Description automatically generated">
-            <a:extLst>
-              <a:ext uri="{FF2B5EF4-FFF2-40B4-BE49-F238E27FC236}">
-                <a16:creationId xmlns:a16="http://schemas.microsoft.com/office/drawing/2014/main" id="{D727886F-0D10-4661-BCDA-D631A5F518E1}"/>
+          <p:cNvPr id="3" name="Picture 2" descr="A close up of a map&#10;&#10;Description automatically generated">
+            <a:extLst>
+              <a:ext uri="{FF2B5EF4-FFF2-40B4-BE49-F238E27FC236}">
+                <a16:creationId xmlns:a16="http://schemas.microsoft.com/office/drawing/2014/main" id="{6B7A1C9C-27CC-4D17-A45E-D3B72621FDF6}"/>
               </a:ext>
             </a:extLst>
           </p:cNvPr>
@@ -3609,14 +3609,191 @@
         </p:blipFill>
         <p:spPr>
           <a:xfrm>
-            <a:off x="0" y="30544"/>
-            <a:ext cx="12192000" cy="6796911"/>
+            <a:off x="0" y="101293"/>
+            <a:ext cx="12192000" cy="6655413"/>
           </a:xfrm>
           <a:prstGeom prst="rect">
             <a:avLst/>
           </a:prstGeom>
         </p:spPr>
       </p:pic>
+      <p:sp>
+        <p:nvSpPr>
+          <p:cNvPr id="6" name="Oval 5">
+            <a:extLst>
+              <a:ext uri="{FF2B5EF4-FFF2-40B4-BE49-F238E27FC236}">
+                <a16:creationId xmlns:a16="http://schemas.microsoft.com/office/drawing/2014/main" id="{33EA8640-F0AC-4DB9-88BD-9F5C394C8F43}"/>
+              </a:ext>
+            </a:extLst>
+          </p:cNvPr>
+          <p:cNvSpPr/>
+          <p:nvPr/>
+        </p:nvSpPr>
+        <p:spPr>
+          <a:xfrm>
+            <a:off x="137773" y="1346669"/>
+            <a:ext cx="436099" cy="411233"/>
+          </a:xfrm>
+          <a:prstGeom prst="ellipse">
+            <a:avLst/>
+          </a:prstGeom>
+          <a:noFill/>
+          <a:ln>
+            <a:solidFill>
+              <a:schemeClr val="tx1"/>
+            </a:solidFill>
+          </a:ln>
+        </p:spPr>
+        <p:style>
+          <a:lnRef idx="2">
+            <a:schemeClr val="dk1">
+              <a:shade val="50000"/>
+            </a:schemeClr>
+          </a:lnRef>
+          <a:fillRef idx="1">
+            <a:schemeClr val="dk1"/>
+          </a:fillRef>
+          <a:effectRef idx="0">
+            <a:schemeClr val="dk1"/>
+          </a:effectRef>
+          <a:fontRef idx="minor">
+            <a:schemeClr val="lt1"/>
+          </a:fontRef>
+        </p:style>
+        <p:txBody>
+          <a:bodyPr rtlCol="0" anchor="ctr"/>
+          <a:lstStyle/>
+          <a:p>
+            <a:pPr algn="ctr"/>
+            <a:r>
+              <a:rPr lang="en-US" sz="3200" dirty="0">
+                <a:solidFill>
+                  <a:schemeClr val="tx1"/>
+                </a:solidFill>
+              </a:rPr>
+              <a:t>A</a:t>
+            </a:r>
+          </a:p>
+        </p:txBody>
+      </p:sp>
+      <p:sp>
+        <p:nvSpPr>
+          <p:cNvPr id="8" name="Oval 7">
+            <a:extLst>
+              <a:ext uri="{FF2B5EF4-FFF2-40B4-BE49-F238E27FC236}">
+                <a16:creationId xmlns:a16="http://schemas.microsoft.com/office/drawing/2014/main" id="{CCC0DDE1-9B67-47E6-8F04-742A8659BEEE}"/>
+              </a:ext>
+            </a:extLst>
+          </p:cNvPr>
+          <p:cNvSpPr/>
+          <p:nvPr/>
+        </p:nvSpPr>
+        <p:spPr>
+          <a:xfrm>
+            <a:off x="3339526" y="270458"/>
+            <a:ext cx="436099" cy="411233"/>
+          </a:xfrm>
+          <a:prstGeom prst="ellipse">
+            <a:avLst/>
+          </a:prstGeom>
+          <a:noFill/>
+          <a:ln>
+            <a:solidFill>
+              <a:schemeClr val="tx1"/>
+            </a:solidFill>
+          </a:ln>
+        </p:spPr>
+        <p:style>
+          <a:lnRef idx="2">
+            <a:schemeClr val="dk1">
+              <a:shade val="50000"/>
+            </a:schemeClr>
+          </a:lnRef>
+          <a:fillRef idx="1">
+            <a:schemeClr val="dk1"/>
+          </a:fillRef>
+          <a:effectRef idx="0">
+            <a:schemeClr val="dk1"/>
+          </a:effectRef>
+          <a:fontRef idx="minor">
+            <a:schemeClr val="lt1"/>
+          </a:fontRef>
+        </p:style>
+        <p:txBody>
+          <a:bodyPr rtlCol="0" anchor="ctr"/>
+          <a:lstStyle/>
+          <a:p>
+            <a:pPr algn="ctr"/>
+            <a:r>
+              <a:rPr lang="en-US" sz="3200" dirty="0">
+                <a:solidFill>
+                  <a:schemeClr val="tx1"/>
+                </a:solidFill>
+              </a:rPr>
+              <a:t>B</a:t>
+            </a:r>
+          </a:p>
+        </p:txBody>
+      </p:sp>
+      <p:sp>
+        <p:nvSpPr>
+          <p:cNvPr id="10" name="Oval 9">
+            <a:extLst>
+              <a:ext uri="{FF2B5EF4-FFF2-40B4-BE49-F238E27FC236}">
+                <a16:creationId xmlns:a16="http://schemas.microsoft.com/office/drawing/2014/main" id="{DF8D1E03-E26D-4809-9FB9-6D10F20BC7F2}"/>
+              </a:ext>
+            </a:extLst>
+          </p:cNvPr>
+          <p:cNvSpPr/>
+          <p:nvPr/>
+        </p:nvSpPr>
+        <p:spPr>
+          <a:xfrm>
+            <a:off x="11317998" y="840266"/>
+            <a:ext cx="436099" cy="411233"/>
+          </a:xfrm>
+          <a:prstGeom prst="ellipse">
+            <a:avLst/>
+          </a:prstGeom>
+          <a:noFill/>
+          <a:ln>
+            <a:solidFill>
+              <a:schemeClr val="tx1"/>
+            </a:solidFill>
+          </a:ln>
+        </p:spPr>
+        <p:style>
+          <a:lnRef idx="2">
+            <a:schemeClr val="dk1">
+              <a:shade val="50000"/>
+            </a:schemeClr>
+          </a:lnRef>
+          <a:fillRef idx="1">
+            <a:schemeClr val="dk1"/>
+          </a:fillRef>
+          <a:effectRef idx="0">
+            <a:schemeClr val="dk1"/>
+          </a:effectRef>
+          <a:fontRef idx="minor">
+            <a:schemeClr val="lt1"/>
+          </a:fontRef>
+        </p:style>
+        <p:txBody>
+          <a:bodyPr rtlCol="0" anchor="ctr"/>
+          <a:lstStyle/>
+          <a:p>
+            <a:pPr algn="ctr"/>
+            <a:r>
+              <a:rPr lang="en-US" sz="3200" dirty="0">
+                <a:solidFill>
+                  <a:schemeClr val="tx1"/>
+                </a:solidFill>
+              </a:rPr>
+              <a:t>C</a:t>
+            </a:r>
+          </a:p>
+        </p:txBody>
+      </p:sp>
     </p:spTree>
     <p:extLst>
       <p:ext uri="{BB962C8B-B14F-4D97-AF65-F5344CB8AC3E}">

</xml_diff>